<commit_message>
change some staff in ppt
</commit_message>
<xml_diff>
--- a/aditya ppt.pptx
+++ b/aditya ppt.pptx
@@ -8655,19 +8655,35 @@
         </p:nvSpPr>
         <p:spPr>
           <a:xfrm>
-            <a:off x="1524000" y="561658"/>
-            <a:ext cx="9144000" cy="2387600"/>
+            <a:off x="1524000" y="1179830"/>
+            <a:ext cx="9144000" cy="1369695"/>
           </a:xfrm>
         </p:spPr>
         <p:txBody>
-          <a:bodyPr/>
+          <a:bodyPr>
+            <a:normAutofit fontScale="90000"/>
+          </a:bodyPr>
           <a:lstStyle/>
           <a:p>
             <a:r>
               <a:rPr lang="en-US" dirty="0"/>
               <a:t>Signature Analysis</a:t>
             </a:r>
-            <a:endParaRPr lang="en-US" dirty="0"/>
+            <a:br>
+              <a:rPr lang="en-US" dirty="0"/>
+            </a:br>
+            <a:r>
+              <a:rPr lang="en-US" sz="4000" dirty="0"/>
+              <a:t>Shipeng Yang</a:t>
+            </a:r>
+            <a:br>
+              <a:rPr lang="en-US" sz="4000" dirty="0"/>
+            </a:br>
+            <a:r>
+              <a:rPr lang="en-US" sz="4000" dirty="0"/>
+              <a:t>Aditya Vijayvergia</a:t>
+            </a:r>
+            <a:endParaRPr lang="en-US" sz="4000" dirty="0"/>
           </a:p>
         </p:txBody>
       </p:sp>

</xml_diff>